<commit_message>
MAB implemented + 2 additional alternatives for AFACT
</commit_message>
<xml_diff>
--- a/Instructions_Pictures/AFACT & MAB Instructions/AfactInstsPresntation.pptx
+++ b/Instructions_Pictures/AFACT & MAB Instructions/AfactInstsPresntation.pptx
@@ -247,7 +247,7 @@
           <a:p>
             <a:fld id="{306B59E2-DA6D-487B-96A5-0C8E7410BF99}" type="datetimeFigureOut">
               <a:rPr lang="he-IL" smtClean="0"/>
-              <a:t>ג'/אלול/תש"ף</a:t>
+              <a:t>י"ג/אלול/תש"ף</a:t>
             </a:fld>
             <a:endParaRPr lang="he-IL"/>
           </a:p>
@@ -417,7 +417,7 @@
           <a:p>
             <a:fld id="{306B59E2-DA6D-487B-96A5-0C8E7410BF99}" type="datetimeFigureOut">
               <a:rPr lang="he-IL" smtClean="0"/>
-              <a:t>ג'/אלול/תש"ף</a:t>
+              <a:t>י"ג/אלול/תש"ף</a:t>
             </a:fld>
             <a:endParaRPr lang="he-IL"/>
           </a:p>
@@ -597,7 +597,7 @@
           <a:p>
             <a:fld id="{306B59E2-DA6D-487B-96A5-0C8E7410BF99}" type="datetimeFigureOut">
               <a:rPr lang="he-IL" smtClean="0"/>
-              <a:t>ג'/אלול/תש"ף</a:t>
+              <a:t>י"ג/אלול/תש"ף</a:t>
             </a:fld>
             <a:endParaRPr lang="he-IL"/>
           </a:p>
@@ -767,7 +767,7 @@
           <a:p>
             <a:fld id="{306B59E2-DA6D-487B-96A5-0C8E7410BF99}" type="datetimeFigureOut">
               <a:rPr lang="he-IL" smtClean="0"/>
-              <a:t>ג'/אלול/תש"ף</a:t>
+              <a:t>י"ג/אלול/תש"ף</a:t>
             </a:fld>
             <a:endParaRPr lang="he-IL"/>
           </a:p>
@@ -1013,7 +1013,7 @@
           <a:p>
             <a:fld id="{306B59E2-DA6D-487B-96A5-0C8E7410BF99}" type="datetimeFigureOut">
               <a:rPr lang="he-IL" smtClean="0"/>
-              <a:t>ג'/אלול/תש"ף</a:t>
+              <a:t>י"ג/אלול/תש"ף</a:t>
             </a:fld>
             <a:endParaRPr lang="he-IL"/>
           </a:p>
@@ -1245,7 +1245,7 @@
           <a:p>
             <a:fld id="{306B59E2-DA6D-487B-96A5-0C8E7410BF99}" type="datetimeFigureOut">
               <a:rPr lang="he-IL" smtClean="0"/>
-              <a:t>ג'/אלול/תש"ף</a:t>
+              <a:t>י"ג/אלול/תש"ף</a:t>
             </a:fld>
             <a:endParaRPr lang="he-IL"/>
           </a:p>
@@ -1612,7 +1612,7 @@
           <a:p>
             <a:fld id="{306B59E2-DA6D-487B-96A5-0C8E7410BF99}" type="datetimeFigureOut">
               <a:rPr lang="he-IL" smtClean="0"/>
-              <a:t>ג'/אלול/תש"ף</a:t>
+              <a:t>י"ג/אלול/תש"ף</a:t>
             </a:fld>
             <a:endParaRPr lang="he-IL"/>
           </a:p>
@@ -1730,7 +1730,7 @@
           <a:p>
             <a:fld id="{306B59E2-DA6D-487B-96A5-0C8E7410BF99}" type="datetimeFigureOut">
               <a:rPr lang="he-IL" smtClean="0"/>
-              <a:t>ג'/אלול/תש"ף</a:t>
+              <a:t>י"ג/אלול/תש"ף</a:t>
             </a:fld>
             <a:endParaRPr lang="he-IL"/>
           </a:p>
@@ -1825,7 +1825,7 @@
           <a:p>
             <a:fld id="{306B59E2-DA6D-487B-96A5-0C8E7410BF99}" type="datetimeFigureOut">
               <a:rPr lang="he-IL" smtClean="0"/>
-              <a:t>ג'/אלול/תש"ף</a:t>
+              <a:t>י"ג/אלול/תש"ף</a:t>
             </a:fld>
             <a:endParaRPr lang="he-IL"/>
           </a:p>
@@ -2102,7 +2102,7 @@
           <a:p>
             <a:fld id="{306B59E2-DA6D-487B-96A5-0C8E7410BF99}" type="datetimeFigureOut">
               <a:rPr lang="he-IL" smtClean="0"/>
-              <a:t>ג'/אלול/תש"ף</a:t>
+              <a:t>י"ג/אלול/תש"ף</a:t>
             </a:fld>
             <a:endParaRPr lang="he-IL"/>
           </a:p>
@@ -2355,7 +2355,7 @@
           <a:p>
             <a:fld id="{306B59E2-DA6D-487B-96A5-0C8E7410BF99}" type="datetimeFigureOut">
               <a:rPr lang="he-IL" smtClean="0"/>
-              <a:t>ג'/אלול/תש"ף</a:t>
+              <a:t>י"ג/אלול/תש"ף</a:t>
             </a:fld>
             <a:endParaRPr lang="he-IL"/>
           </a:p>
@@ -2571,7 +2571,7 @@
           <a:p>
             <a:fld id="{306B59E2-DA6D-487B-96A5-0C8E7410BF99}" type="datetimeFigureOut">
               <a:rPr lang="he-IL" smtClean="0"/>
-              <a:t>ג'/אלול/תש"ף</a:t>
+              <a:t>י"ג/אלול/תש"ף</a:t>
             </a:fld>
             <a:endParaRPr lang="he-IL"/>
           </a:p>
@@ -3091,10 +3091,10 @@
                 <a:latin typeface="David" panose="020E0502060401010101" pitchFamily="34" charset="-79"/>
                 <a:cs typeface="David" panose="020E0502060401010101" pitchFamily="34" charset="-79"/>
               </a:rPr>
-              <a:t>הטיית קשב למחשבות מסוימות אשר אותן לרוב אתה מגדיר כשליליות</a:t>
-            </a:r>
-            <a:r>
-              <a:rPr lang="he-IL" sz="2325" dirty="0">
+              <a:t>הטיית קשב למחשבות מסוימות</a:t>
+            </a:r>
+            <a:r>
+              <a:rPr lang="en-US" sz="2325" dirty="0">
                 <a:solidFill>
                   <a:schemeClr val="tx1"/>
                 </a:solidFill>
@@ -3103,6 +3103,13 @@
               </a:rPr>
               <a:t>.</a:t>
             </a:r>
+            <a:endParaRPr lang="he-IL" sz="2325" dirty="0">
+              <a:solidFill>
+                <a:schemeClr val="tx1"/>
+              </a:solidFill>
+              <a:latin typeface="David" panose="020E0502060401010101" pitchFamily="34" charset="-79"/>
+              <a:cs typeface="David" panose="020E0502060401010101" pitchFamily="34" charset="-79"/>
+            </a:endParaRPr>
           </a:p>
           <a:p>
             <a:pPr algn="ctr" rtl="1"/>
@@ -3288,7 +3295,7 @@
                 <a:latin typeface="David" panose="020E0502060401010101" pitchFamily="34" charset="-79"/>
                 <a:cs typeface="David" panose="020E0502060401010101" pitchFamily="34" charset="-79"/>
               </a:rPr>
-              <a:t>בשלב הבא של הניסוי, אתה תבצע מטלה שנועדה להפחית את המידה שבה הקשב שלך מושפע ממחשבות שליליות.</a:t>
+              <a:t>בשלב הבא של הניסוי, אתה תבצע אימון מנטלי שנועד להפחית את הטיית הקשב שלך.</a:t>
             </a:r>
           </a:p>
           <a:p>
@@ -3311,7 +3318,7 @@
                 <a:latin typeface="David" panose="020E0502060401010101" pitchFamily="34" charset="-79"/>
                 <a:cs typeface="David" panose="020E0502060401010101" pitchFamily="34" charset="-79"/>
               </a:rPr>
-              <a:t>המטלה דומה לזו שביצעת קודם, רק שהפעם בחלק מהצעדים המחשב יציג בפניך משוב על הדרך שבה הפנית את הקשב שלך.</a:t>
+              <a:t>האימון דומה למטלה שביצעת קודם, רק שהפעם בחלק מהצעדים המחשב יציג בפניך משוב על המידה בה הקשב שלך מוטה.</a:t>
             </a:r>
           </a:p>
           <a:p>

</xml_diff>